<commit_message>
Test classes and methods
</commit_message>
<xml_diff>
--- a/inst/ppt/ppt_template.pptx
+++ b/inst/ppt/ppt_template.pptx
@@ -101,6 +101,11 @@
       </a:defRPr>
     </a:lvl9pPr>
   </p:defaultTextStyle>
+  <p:extLst>
+    <p:ext uri="{EFAFB233-063F-42B5-8137-9DF3F51BA10A}">
+      <p15:sldGuideLst xmlns:p15="http://schemas.microsoft.com/office/powerpoint/2012/main"/>
+    </p:ext>
+  </p:extLst>
 </p:presentation>
 </file>
 
@@ -364,38 +369,38 @@
           <a:p>
             <a:pPr lvl="0"/>
             <a:r>
-              <a:rPr lang="nb-NO" smtClean="0"/>
+              <a:rPr lang="nb-NO" dirty="0" smtClean="0"/>
               <a:t>Klikk for å redigere tekststiler i malen</a:t>
             </a:r>
           </a:p>
           <a:p>
             <a:pPr lvl="1"/>
             <a:r>
-              <a:rPr lang="nb-NO" smtClean="0"/>
+              <a:rPr lang="nb-NO" dirty="0" smtClean="0"/>
               <a:t>Andre nivå</a:t>
             </a:r>
           </a:p>
           <a:p>
             <a:pPr lvl="2"/>
             <a:r>
-              <a:rPr lang="nb-NO" smtClean="0"/>
+              <a:rPr lang="nb-NO" dirty="0" smtClean="0"/>
               <a:t>Tredje nivå</a:t>
             </a:r>
           </a:p>
           <a:p>
             <a:pPr lvl="3"/>
             <a:r>
-              <a:rPr lang="nb-NO" smtClean="0"/>
+              <a:rPr lang="nb-NO" dirty="0" smtClean="0"/>
               <a:t>Fjerde nivå</a:t>
             </a:r>
           </a:p>
           <a:p>
             <a:pPr lvl="4"/>
             <a:r>
-              <a:rPr lang="nb-NO" smtClean="0"/>
+              <a:rPr lang="nb-NO" dirty="0" smtClean="0"/>
               <a:t>Femte nivå</a:t>
             </a:r>
-            <a:endParaRPr lang="nb-NO"/>
+            <a:endParaRPr lang="nb-NO" dirty="0"/>
           </a:p>
         </p:txBody>
       </p:sp>
@@ -742,38 +747,38 @@
           <a:p>
             <a:pPr lvl="0"/>
             <a:r>
-              <a:rPr lang="nb-NO" smtClean="0"/>
+              <a:rPr lang="nb-NO" dirty="0" smtClean="0"/>
               <a:t>Klikk for å redigere tekststiler i malen</a:t>
             </a:r>
           </a:p>
           <a:p>
             <a:pPr lvl="1"/>
             <a:r>
-              <a:rPr lang="nb-NO" smtClean="0"/>
+              <a:rPr lang="nb-NO" dirty="0" smtClean="0"/>
               <a:t>Andre nivå</a:t>
             </a:r>
           </a:p>
           <a:p>
             <a:pPr lvl="2"/>
             <a:r>
-              <a:rPr lang="nb-NO" smtClean="0"/>
+              <a:rPr lang="nb-NO" dirty="0" smtClean="0"/>
               <a:t>Tredje nivå</a:t>
             </a:r>
           </a:p>
           <a:p>
             <a:pPr lvl="3"/>
             <a:r>
-              <a:rPr lang="nb-NO" smtClean="0"/>
+              <a:rPr lang="nb-NO" dirty="0" smtClean="0"/>
               <a:t>Fjerde nivå</a:t>
             </a:r>
           </a:p>
           <a:p>
             <a:pPr lvl="4"/>
             <a:r>
-              <a:rPr lang="nb-NO" smtClean="0"/>
+              <a:rPr lang="nb-NO" dirty="0" smtClean="0"/>
               <a:t>Femte nivå</a:t>
             </a:r>
-            <a:endParaRPr lang="nb-NO"/>
+            <a:endParaRPr lang="nb-NO" dirty="0"/>
           </a:p>
         </p:txBody>
       </p:sp>
@@ -1147,9 +1152,9 @@
           <a:solidFill>
             <a:schemeClr val="bg1"/>
           </a:solidFill>
-          <a:latin typeface="Sisco Book" panose="02000503030000020004" pitchFamily="50" charset="0"/>
-          <a:ea typeface="+mj-ea"/>
-          <a:cs typeface="+mj-cs"/>
+          <a:latin typeface="Open Sans" panose="020B0606030504020204" pitchFamily="34" charset="0"/>
+          <a:ea typeface="Open Sans" panose="020B0606030504020204" pitchFamily="34" charset="0"/>
+          <a:cs typeface="Open Sans" panose="020B0606030504020204" pitchFamily="34" charset="0"/>
         </a:defRPr>
       </a:lvl1pPr>
     </p:titleStyle>
@@ -1170,9 +1175,9 @@
           <a:solidFill>
             <a:srgbClr val="23373B"/>
           </a:solidFill>
-          <a:latin typeface="Sisco Book" panose="02000503030000020004" pitchFamily="50" charset="0"/>
-          <a:ea typeface="+mn-ea"/>
-          <a:cs typeface="+mn-cs"/>
+          <a:latin typeface="Open Sans Light" panose="020B0306030504020204" pitchFamily="34" charset="0"/>
+          <a:ea typeface="Open Sans Light" panose="020B0306030504020204" pitchFamily="34" charset="0"/>
+          <a:cs typeface="Open Sans Light" panose="020B0306030504020204" pitchFamily="34" charset="0"/>
         </a:defRPr>
       </a:lvl1pPr>
       <a:lvl2pPr marL="685800" indent="-228600" algn="l" defTabSz="914400" rtl="0" eaLnBrk="1" latinLnBrk="0" hangingPunct="1">
@@ -1191,9 +1196,9 @@
           <a:solidFill>
             <a:srgbClr val="23373B"/>
           </a:solidFill>
-          <a:latin typeface="Sisco Book" panose="02000503030000020004" pitchFamily="50" charset="0"/>
-          <a:ea typeface="+mn-ea"/>
-          <a:cs typeface="+mn-cs"/>
+          <a:latin typeface="Open Sans Light" panose="020B0306030504020204" pitchFamily="34" charset="0"/>
+          <a:ea typeface="Open Sans Light" panose="020B0306030504020204" pitchFamily="34" charset="0"/>
+          <a:cs typeface="Open Sans Light" panose="020B0306030504020204" pitchFamily="34" charset="0"/>
         </a:defRPr>
       </a:lvl2pPr>
       <a:lvl3pPr marL="1143000" indent="-228600" algn="l" defTabSz="914400" rtl="0" eaLnBrk="1" latinLnBrk="0" hangingPunct="1">
@@ -1212,9 +1217,9 @@
           <a:solidFill>
             <a:srgbClr val="23373B"/>
           </a:solidFill>
-          <a:latin typeface="Sisco Book" panose="02000503030000020004" pitchFamily="50" charset="0"/>
-          <a:ea typeface="+mn-ea"/>
-          <a:cs typeface="+mn-cs"/>
+          <a:latin typeface="Open Sans Light" panose="020B0306030504020204" pitchFamily="34" charset="0"/>
+          <a:ea typeface="Open Sans Light" panose="020B0306030504020204" pitchFamily="34" charset="0"/>
+          <a:cs typeface="Open Sans Light" panose="020B0306030504020204" pitchFamily="34" charset="0"/>
         </a:defRPr>
       </a:lvl3pPr>
       <a:lvl4pPr marL="1600200" indent="-228600" algn="l" defTabSz="914400" rtl="0" eaLnBrk="1" latinLnBrk="0" hangingPunct="1">
@@ -1233,9 +1238,9 @@
           <a:solidFill>
             <a:srgbClr val="23373B"/>
           </a:solidFill>
-          <a:latin typeface="Sisco Book" panose="02000503030000020004" pitchFamily="50" charset="0"/>
-          <a:ea typeface="+mn-ea"/>
-          <a:cs typeface="+mn-cs"/>
+          <a:latin typeface="Open Sans Light" panose="020B0306030504020204" pitchFamily="34" charset="0"/>
+          <a:ea typeface="Open Sans Light" panose="020B0306030504020204" pitchFamily="34" charset="0"/>
+          <a:cs typeface="Open Sans Light" panose="020B0306030504020204" pitchFamily="34" charset="0"/>
         </a:defRPr>
       </a:lvl4pPr>
       <a:lvl5pPr marL="2057400" indent="-228600" algn="l" defTabSz="914400" rtl="0" eaLnBrk="1" latinLnBrk="0" hangingPunct="1">
@@ -1254,9 +1259,9 @@
           <a:solidFill>
             <a:srgbClr val="23373B"/>
           </a:solidFill>
-          <a:latin typeface="Sisco Book" panose="02000503030000020004" pitchFamily="50" charset="0"/>
-          <a:ea typeface="+mn-ea"/>
-          <a:cs typeface="+mn-cs"/>
+          <a:latin typeface="Open Sans Light" panose="020B0306030504020204" pitchFamily="34" charset="0"/>
+          <a:ea typeface="Open Sans Light" panose="020B0306030504020204" pitchFamily="34" charset="0"/>
+          <a:cs typeface="Open Sans Light" panose="020B0306030504020204" pitchFamily="34" charset="0"/>
         </a:defRPr>
       </a:lvl5pPr>
       <a:lvl6pPr marL="2514600" indent="-228600" algn="l" defTabSz="914400" rtl="0" eaLnBrk="1" latinLnBrk="0" hangingPunct="1">

</xml_diff>